<commit_message>
updates because of the change in the agenda
</commit_message>
<xml_diff>
--- a/Reviews/2016/wip/1 Introduction.pptx
+++ b/Reviews/2016/wip/1 Introduction.pptx
@@ -112,6 +112,11 @@
       </a:defRPr>
     </a:lvl9pPr>
   </p:defaultTextStyle>
+  <p:extLst>
+    <p:ext uri="{EFAFB233-063F-42B5-8137-9DF3F51BA10A}">
+      <p15:sldGuideLst xmlns:p15="http://schemas.microsoft.com/office/powerpoint/2012/main"/>
+    </p:ext>
+  </p:extLst>
 </p:presentation>
 </file>
 
@@ -8478,7 +8483,42 @@
                 </a:uFill>
                 <a:latin typeface="Arial"/>
               </a:rPr>
-              <a:t>(20 min) [13:20 - 13:40]</a:t>
+              <a:t>(30 min) [13:20 - 13:50]</a:t>
+            </a:r>
+          </a:p>
+          <a:p>
+            <a:pPr marL="457200" indent="-456840">
+              <a:buClr>
+                <a:srgbClr val="FF0000"/>
+              </a:buClr>
+              <a:buFont typeface="Calibri"/>
+              <a:buAutoNum type="arabicPeriod"/>
+            </a:pPr>
+            <a:r>
+              <a:rPr lang="nl-NL" sz="2200" spc="-1" dirty="0">
+                <a:solidFill>
+                  <a:srgbClr val="FF0000"/>
+                </a:solidFill>
+                <a:uFill>
+                  <a:solidFill>
+                    <a:srgbClr val="FFFFFF"/>
+                  </a:solidFill>
+                </a:uFill>
+              </a:rPr>
+              <a:t>Exploitation Related Activities (WP7) </a:t>
+            </a:r>
+            <a:r>
+              <a:rPr lang="nl-NL" sz="2200" spc="-1" dirty="0">
+                <a:solidFill>
+                  <a:srgbClr val="000000"/>
+                </a:solidFill>
+                <a:uFill>
+                  <a:solidFill>
+                    <a:srgbClr val="FFFFFF"/>
+                  </a:solidFill>
+                </a:uFill>
+              </a:rPr>
+              <a:t>(10 mins) [13:50 - 14:00]</a:t>
             </a:r>
           </a:p>
           <a:p>
@@ -8518,7 +8558,35 @@
                 </a:uFill>
                 <a:latin typeface="Arial"/>
               </a:rPr>
-              <a:t>(45 mins) [13:40 - 14:25]</a:t>
+              <a:t>(</a:t>
+            </a:r>
+            <a:r>
+              <a:rPr lang="nl-NL" sz="2200" spc="-1" dirty="0">
+                <a:solidFill>
+                  <a:srgbClr val="000000"/>
+                </a:solidFill>
+                <a:uFill>
+                  <a:solidFill>
+                    <a:srgbClr val="FFFFFF"/>
+                  </a:solidFill>
+                </a:uFill>
+                <a:latin typeface="Arial"/>
+              </a:rPr>
+              <a:t>30</a:t>
+            </a:r>
+            <a:r>
+              <a:rPr lang="nl-NL" sz="2200" b="0" strike="noStrike" spc="-1" dirty="0">
+                <a:solidFill>
+                  <a:srgbClr val="000000"/>
+                </a:solidFill>
+                <a:uFill>
+                  <a:solidFill>
+                    <a:srgbClr val="FFFFFF"/>
+                  </a:solidFill>
+                </a:uFill>
+                <a:latin typeface="Arial"/>
+              </a:rPr>
+              <a:t> mins) [14:00 - 14:30]</a:t>
             </a:r>
           </a:p>
           <a:p>
@@ -8558,7 +8626,7 @@
                 </a:uFill>
                 <a:latin typeface="Arial"/>
               </a:rPr>
-              <a:t>(10 mins) [14:25 - 14:35]</a:t>
+              <a:t>(10 mins) [14:30 - 14:40]</a:t>
             </a:r>
           </a:p>
           <a:p>
@@ -8584,47 +8652,7 @@
                 </a:uFill>
                 <a:latin typeface="Arial"/>
               </a:rPr>
-              <a:t>Break (15 mins) [14:35 - 14:50]</a:t>
-            </a:r>
-          </a:p>
-          <a:p>
-            <a:pPr marL="457200" indent="-456840">
-              <a:lnSpc>
-                <a:spcPct val="100000"/>
-              </a:lnSpc>
-              <a:buClr>
-                <a:srgbClr val="FF0000"/>
-              </a:buClr>
-              <a:buFont typeface="Calibri"/>
-              <a:buAutoNum type="arabicPeriod" startAt="6"/>
-            </a:pPr>
-            <a:r>
-              <a:rPr lang="nl-NL" sz="2200" b="0" strike="noStrike" spc="-1" dirty="0">
-                <a:solidFill>
-                  <a:srgbClr val="FF0000"/>
-                </a:solidFill>
-                <a:uFill>
-                  <a:solidFill>
-                    <a:srgbClr val="FFFFFF"/>
-                  </a:solidFill>
-                </a:uFill>
-                <a:latin typeface="Arial"/>
-              </a:rPr>
-              <a:t>Exploitation Related Activities (WP7) </a:t>
-            </a:r>
-            <a:r>
-              <a:rPr lang="nl-NL" sz="2200" b="0" strike="noStrike" spc="-1" dirty="0">
-                <a:solidFill>
-                  <a:srgbClr val="000000"/>
-                </a:solidFill>
-                <a:uFill>
-                  <a:solidFill>
-                    <a:srgbClr val="FFFFFF"/>
-                  </a:solidFill>
-                </a:uFill>
-                <a:latin typeface="Arial"/>
-              </a:rPr>
-              <a:t>(10 mins) [14:50 - 15:00]</a:t>
+              <a:t>Break (15 mins) [14:40 - 15:00]</a:t>
             </a:r>
           </a:p>
           <a:p>

</xml_diff>